<commit_message>
Pressure / Temperature link working
</commit_message>
<xml_diff>
--- a/prog_help/EnthalpyDraw.pptx
+++ b/prog_help/EnthalpyDraw.pptx
@@ -310,7 +310,7 @@
           <a:p>
             <a:fld id="{42968C2D-30BC-42AA-92C6-446775E33AE6}" type="datetimeFigureOut">
               <a:rPr lang="fr-FR" smtClean="0"/>
-              <a:t>17/12/2016</a:t>
+              <a:t>18/12/2016</a:t>
             </a:fld>
             <a:endParaRPr lang="fr-FR"/>
           </a:p>
@@ -480,7 +480,7 @@
           <a:p>
             <a:fld id="{42968C2D-30BC-42AA-92C6-446775E33AE6}" type="datetimeFigureOut">
               <a:rPr lang="fr-FR" smtClean="0"/>
-              <a:t>17/12/2016</a:t>
+              <a:t>18/12/2016</a:t>
             </a:fld>
             <a:endParaRPr lang="fr-FR"/>
           </a:p>
@@ -660,7 +660,7 @@
           <a:p>
             <a:fld id="{42968C2D-30BC-42AA-92C6-446775E33AE6}" type="datetimeFigureOut">
               <a:rPr lang="fr-FR" smtClean="0"/>
-              <a:t>17/12/2016</a:t>
+              <a:t>18/12/2016</a:t>
             </a:fld>
             <a:endParaRPr lang="fr-FR"/>
           </a:p>
@@ -830,7 +830,7 @@
           <a:p>
             <a:fld id="{42968C2D-30BC-42AA-92C6-446775E33AE6}" type="datetimeFigureOut">
               <a:rPr lang="fr-FR" smtClean="0"/>
-              <a:t>17/12/2016</a:t>
+              <a:t>18/12/2016</a:t>
             </a:fld>
             <a:endParaRPr lang="fr-FR"/>
           </a:p>
@@ -1076,7 +1076,7 @@
           <a:p>
             <a:fld id="{42968C2D-30BC-42AA-92C6-446775E33AE6}" type="datetimeFigureOut">
               <a:rPr lang="fr-FR" smtClean="0"/>
-              <a:t>17/12/2016</a:t>
+              <a:t>18/12/2016</a:t>
             </a:fld>
             <a:endParaRPr lang="fr-FR"/>
           </a:p>
@@ -1364,7 +1364,7 @@
           <a:p>
             <a:fld id="{42968C2D-30BC-42AA-92C6-446775E33AE6}" type="datetimeFigureOut">
               <a:rPr lang="fr-FR" smtClean="0"/>
-              <a:t>17/12/2016</a:t>
+              <a:t>18/12/2016</a:t>
             </a:fld>
             <a:endParaRPr lang="fr-FR"/>
           </a:p>
@@ -1786,7 +1786,7 @@
           <a:p>
             <a:fld id="{42968C2D-30BC-42AA-92C6-446775E33AE6}" type="datetimeFigureOut">
               <a:rPr lang="fr-FR" smtClean="0"/>
-              <a:t>17/12/2016</a:t>
+              <a:t>18/12/2016</a:t>
             </a:fld>
             <a:endParaRPr lang="fr-FR"/>
           </a:p>
@@ -1904,7 +1904,7 @@
           <a:p>
             <a:fld id="{42968C2D-30BC-42AA-92C6-446775E33AE6}" type="datetimeFigureOut">
               <a:rPr lang="fr-FR" smtClean="0"/>
-              <a:t>17/12/2016</a:t>
+              <a:t>18/12/2016</a:t>
             </a:fld>
             <a:endParaRPr lang="fr-FR"/>
           </a:p>
@@ -1999,7 +1999,7 @@
           <a:p>
             <a:fld id="{42968C2D-30BC-42AA-92C6-446775E33AE6}" type="datetimeFigureOut">
               <a:rPr lang="fr-FR" smtClean="0"/>
-              <a:t>17/12/2016</a:t>
+              <a:t>18/12/2016</a:t>
             </a:fld>
             <a:endParaRPr lang="fr-FR"/>
           </a:p>
@@ -2276,7 +2276,7 @@
           <a:p>
             <a:fld id="{42968C2D-30BC-42AA-92C6-446775E33AE6}" type="datetimeFigureOut">
               <a:rPr lang="fr-FR" smtClean="0"/>
-              <a:t>17/12/2016</a:t>
+              <a:t>18/12/2016</a:t>
             </a:fld>
             <a:endParaRPr lang="fr-FR"/>
           </a:p>
@@ -2529,7 +2529,7 @@
           <a:p>
             <a:fld id="{42968C2D-30BC-42AA-92C6-446775E33AE6}" type="datetimeFigureOut">
               <a:rPr lang="fr-FR" smtClean="0"/>
-              <a:t>17/12/2016</a:t>
+              <a:t>18/12/2016</a:t>
             </a:fld>
             <a:endParaRPr lang="fr-FR"/>
           </a:p>
@@ -2742,7 +2742,7 @@
           <a:p>
             <a:fld id="{42968C2D-30BC-42AA-92C6-446775E33AE6}" type="datetimeFigureOut">
               <a:rPr lang="fr-FR" smtClean="0"/>
-              <a:t>17/12/2016</a:t>
+              <a:t>18/12/2016</a:t>
             </a:fld>
             <a:endParaRPr lang="fr-FR"/>
           </a:p>
@@ -10021,7 +10021,6 @@
               <a:rPr lang="fr-FR" dirty="0" smtClean="0"/>
               <a:t>/zoom</a:t>
             </a:r>
-            <a:endParaRPr lang="fr-FR" dirty="0" smtClean="0"/>
           </a:p>
         </p:txBody>
       </p:sp>
@@ -11735,11 +11734,7 @@
           <a:p>
             <a:r>
               <a:rPr lang="fr-FR" dirty="0" smtClean="0"/>
-              <a:t>x </a:t>
-            </a:r>
-            <a:r>
-              <a:rPr lang="fr-FR" dirty="0" smtClean="0"/>
-              <a:t>= </a:t>
+              <a:t>x = </a:t>
             </a:r>
             <a:r>
               <a:rPr lang="fr-FR" dirty="0" err="1" smtClean="0"/>

</xml_diff>